<commit_message>
Added user story excel and updated model per spotify link
</commit_message>
<xml_diff>
--- a/design/Wireframe.pptx
+++ b/design/Wireframe.pptx
@@ -244,7 +244,7 @@
           <a:p>
             <a:fld id="{83BD93B1-4FFB-4F2F-86DA-FC2169DC86CC}" type="datetimeFigureOut">
               <a:rPr lang="en-US" smtClean="0"/>
-              <a:t>8/17/2017</a:t>
+              <a:t>8/18/2017</a:t>
             </a:fld>
             <a:endParaRPr lang="en-US"/>
           </a:p>
@@ -811,7 +811,7 @@
           <a:p>
             <a:fld id="{C3ED2144-9C76-4636-9D8F-BA5586FDC78C}" type="datetimeFigureOut">
               <a:rPr lang="en-US" smtClean="0"/>
-              <a:t>8/17/2017</a:t>
+              <a:t>8/18/2017</a:t>
             </a:fld>
             <a:endParaRPr lang="en-US"/>
           </a:p>
@@ -981,7 +981,7 @@
           <a:p>
             <a:fld id="{C3ED2144-9C76-4636-9D8F-BA5586FDC78C}" type="datetimeFigureOut">
               <a:rPr lang="en-US" smtClean="0"/>
-              <a:t>8/17/2017</a:t>
+              <a:t>8/18/2017</a:t>
             </a:fld>
             <a:endParaRPr lang="en-US"/>
           </a:p>
@@ -1161,7 +1161,7 @@
           <a:p>
             <a:fld id="{C3ED2144-9C76-4636-9D8F-BA5586FDC78C}" type="datetimeFigureOut">
               <a:rPr lang="en-US" smtClean="0"/>
-              <a:t>8/17/2017</a:t>
+              <a:t>8/18/2017</a:t>
             </a:fld>
             <a:endParaRPr lang="en-US"/>
           </a:p>
@@ -1331,7 +1331,7 @@
           <a:p>
             <a:fld id="{C3ED2144-9C76-4636-9D8F-BA5586FDC78C}" type="datetimeFigureOut">
               <a:rPr lang="en-US" smtClean="0"/>
-              <a:t>8/17/2017</a:t>
+              <a:t>8/18/2017</a:t>
             </a:fld>
             <a:endParaRPr lang="en-US"/>
           </a:p>
@@ -1577,7 +1577,7 @@
           <a:p>
             <a:fld id="{C3ED2144-9C76-4636-9D8F-BA5586FDC78C}" type="datetimeFigureOut">
               <a:rPr lang="en-US" smtClean="0"/>
-              <a:t>8/17/2017</a:t>
+              <a:t>8/18/2017</a:t>
             </a:fld>
             <a:endParaRPr lang="en-US"/>
           </a:p>
@@ -1809,7 +1809,7 @@
           <a:p>
             <a:fld id="{C3ED2144-9C76-4636-9D8F-BA5586FDC78C}" type="datetimeFigureOut">
               <a:rPr lang="en-US" smtClean="0"/>
-              <a:t>8/17/2017</a:t>
+              <a:t>8/18/2017</a:t>
             </a:fld>
             <a:endParaRPr lang="en-US"/>
           </a:p>
@@ -2176,7 +2176,7 @@
           <a:p>
             <a:fld id="{C3ED2144-9C76-4636-9D8F-BA5586FDC78C}" type="datetimeFigureOut">
               <a:rPr lang="en-US" smtClean="0"/>
-              <a:t>8/17/2017</a:t>
+              <a:t>8/18/2017</a:t>
             </a:fld>
             <a:endParaRPr lang="en-US"/>
           </a:p>
@@ -2294,7 +2294,7 @@
           <a:p>
             <a:fld id="{C3ED2144-9C76-4636-9D8F-BA5586FDC78C}" type="datetimeFigureOut">
               <a:rPr lang="en-US" smtClean="0"/>
-              <a:t>8/17/2017</a:t>
+              <a:t>8/18/2017</a:t>
             </a:fld>
             <a:endParaRPr lang="en-US"/>
           </a:p>
@@ -2389,7 +2389,7 @@
           <a:p>
             <a:fld id="{C3ED2144-9C76-4636-9D8F-BA5586FDC78C}" type="datetimeFigureOut">
               <a:rPr lang="en-US" smtClean="0"/>
-              <a:t>8/17/2017</a:t>
+              <a:t>8/18/2017</a:t>
             </a:fld>
             <a:endParaRPr lang="en-US"/>
           </a:p>
@@ -2666,7 +2666,7 @@
           <a:p>
             <a:fld id="{C3ED2144-9C76-4636-9D8F-BA5586FDC78C}" type="datetimeFigureOut">
               <a:rPr lang="en-US" smtClean="0"/>
-              <a:t>8/17/2017</a:t>
+              <a:t>8/18/2017</a:t>
             </a:fld>
             <a:endParaRPr lang="en-US"/>
           </a:p>
@@ -2919,7 +2919,7 @@
           <a:p>
             <a:fld id="{C3ED2144-9C76-4636-9D8F-BA5586FDC78C}" type="datetimeFigureOut">
               <a:rPr lang="en-US" smtClean="0"/>
-              <a:t>8/17/2017</a:t>
+              <a:t>8/18/2017</a:t>
             </a:fld>
             <a:endParaRPr lang="en-US"/>
           </a:p>
@@ -3132,7 +3132,7 @@
           <a:p>
             <a:fld id="{C3ED2144-9C76-4636-9D8F-BA5586FDC78C}" type="datetimeFigureOut">
               <a:rPr lang="en-US" smtClean="0"/>
-              <a:t>8/17/2017</a:t>
+              <a:t>8/18/2017</a:t>
             </a:fld>
             <a:endParaRPr lang="en-US"/>
           </a:p>
@@ -6356,7 +6356,11 @@
             <a:pPr algn="ctr"/>
             <a:r>
               <a:rPr lang="en-US" dirty="0" smtClean="0"/>
-              <a:t>Comment Post</a:t>
+              <a:t>Comment </a:t>
+            </a:r>
+            <a:r>
+              <a:rPr lang="en-US" dirty="0" smtClean="0"/>
+              <a:t>On Post</a:t>
             </a:r>
             <a:endParaRPr lang="en-US" dirty="0"/>
           </a:p>
@@ -6416,7 +6420,7 @@
           <a:p>
             <a:r>
               <a:rPr lang="en-US" dirty="0" smtClean="0"/>
-              <a:t>Roadmap</a:t>
+              <a:t>Engineering Roadmap</a:t>
             </a:r>
             <a:endParaRPr lang="en-US" dirty="0"/>
           </a:p>
@@ -6496,12 +6500,12 @@
       </p:sp>
       <p:sp>
         <p:nvSpPr>
-          <p:cNvPr id="3" name="Content Placeholder 2"/>
+          <p:cNvPr id="4" name="Text Placeholder 3"/>
           <p:cNvSpPr>
             <a:spLocks noGrp="1"/>
           </p:cNvSpPr>
           <p:nvPr>
-            <p:ph idx="1"/>
+            <p:ph type="body" idx="1"/>
           </p:nvPr>
         </p:nvSpPr>
         <p:spPr/>
@@ -6509,7 +6513,94 @@
           <a:bodyPr/>
           <a:lstStyle/>
           <a:p>
+            <a:endParaRPr lang="en-US" dirty="0"/>
+          </a:p>
+        </p:txBody>
+      </p:sp>
+      <p:sp>
+        <p:nvSpPr>
+          <p:cNvPr id="5" name="Content Placeholder 4"/>
+          <p:cNvSpPr>
+            <a:spLocks noGrp="1"/>
+          </p:cNvSpPr>
+          <p:nvPr>
+            <p:ph sz="half" idx="2"/>
+          </p:nvPr>
+        </p:nvSpPr>
+        <p:spPr/>
+        <p:txBody>
+          <a:bodyPr/>
+          <a:lstStyle/>
+          <a:p>
+            <a:r>
+              <a:rPr lang="en-US" dirty="0" smtClean="0"/>
+              <a:t>Kyle wants to create a group for his friends from college to stay in touch through music</a:t>
+            </a:r>
+          </a:p>
+          <a:p>
+            <a:r>
+              <a:rPr lang="en-US" dirty="0" smtClean="0"/>
+              <a:t>Kyle uses Spotify frequently throughout the day</a:t>
+            </a:r>
+          </a:p>
+          <a:p>
+            <a:endParaRPr lang="en-US" dirty="0"/>
+          </a:p>
+        </p:txBody>
+      </p:sp>
+      <p:sp>
+        <p:nvSpPr>
+          <p:cNvPr id="6" name="Text Placeholder 5"/>
+          <p:cNvSpPr>
+            <a:spLocks noGrp="1"/>
+          </p:cNvSpPr>
+          <p:nvPr>
+            <p:ph type="body" sz="quarter" idx="3"/>
+          </p:nvPr>
+        </p:nvSpPr>
+        <p:spPr/>
+        <p:txBody>
+          <a:bodyPr/>
+          <a:lstStyle/>
+          <a:p>
             <a:endParaRPr lang="en-US"/>
+          </a:p>
+        </p:txBody>
+      </p:sp>
+      <p:sp>
+        <p:nvSpPr>
+          <p:cNvPr id="7" name="Content Placeholder 6"/>
+          <p:cNvSpPr>
+            <a:spLocks noGrp="1"/>
+          </p:cNvSpPr>
+          <p:nvPr>
+            <p:ph sz="quarter" idx="4"/>
+          </p:nvPr>
+        </p:nvSpPr>
+        <p:spPr/>
+        <p:txBody>
+          <a:bodyPr/>
+          <a:lstStyle/>
+          <a:p>
+            <a:r>
+              <a:rPr lang="en-US" dirty="0" smtClean="0"/>
+              <a:t>Jane went to college with Kyle</a:t>
+            </a:r>
+          </a:p>
+          <a:p>
+            <a:r>
+              <a:rPr lang="en-US" dirty="0" smtClean="0"/>
+              <a:t>Jane received an invite to join </a:t>
+            </a:r>
+            <a:r>
+              <a:rPr lang="en-US" dirty="0" err="1" smtClean="0"/>
+              <a:t>JustNoise</a:t>
+            </a:r>
+            <a:r>
+              <a:rPr lang="en-US" dirty="0" smtClean="0"/>
+              <a:t> from Kyle</a:t>
+            </a:r>
+            <a:endParaRPr lang="en-US" dirty="0"/>
           </a:p>
         </p:txBody>
       </p:sp>
@@ -6561,6 +6652,132 @@
             <a:r>
               <a:rPr lang="en-US" dirty="0" smtClean="0"/>
               <a:t>Architecture</a:t>
+            </a:r>
+            <a:endParaRPr lang="en-US" dirty="0"/>
+          </a:p>
+        </p:txBody>
+      </p:sp>
+      <p:sp>
+        <p:nvSpPr>
+          <p:cNvPr id="3" name="Rounded Rectangle 2"/>
+          <p:cNvSpPr/>
+          <p:nvPr/>
+        </p:nvSpPr>
+        <p:spPr>
+          <a:xfrm>
+            <a:off x="1892300" y="2311400"/>
+            <a:ext cx="1409700" cy="838200"/>
+          </a:xfrm>
+          <a:prstGeom prst="roundRect">
+            <a:avLst/>
+          </a:prstGeom>
+        </p:spPr>
+        <p:style>
+          <a:lnRef idx="2">
+            <a:schemeClr val="accent5"/>
+          </a:lnRef>
+          <a:fillRef idx="1">
+            <a:schemeClr val="lt1"/>
+          </a:fillRef>
+          <a:effectRef idx="0">
+            <a:schemeClr val="accent5"/>
+          </a:effectRef>
+          <a:fontRef idx="minor">
+            <a:schemeClr val="dk1"/>
+          </a:fontRef>
+        </p:style>
+        <p:txBody>
+          <a:bodyPr rtlCol="0" anchor="ctr"/>
+          <a:lstStyle/>
+          <a:p>
+            <a:pPr algn="ctr"/>
+            <a:r>
+              <a:rPr lang="en-US" dirty="0" smtClean="0"/>
+              <a:t>Views</a:t>
+            </a:r>
+            <a:endParaRPr lang="en-US" dirty="0"/>
+          </a:p>
+        </p:txBody>
+      </p:sp>
+      <p:sp>
+        <p:nvSpPr>
+          <p:cNvPr id="4" name="Rounded Rectangle 3"/>
+          <p:cNvSpPr/>
+          <p:nvPr/>
+        </p:nvSpPr>
+        <p:spPr>
+          <a:xfrm>
+            <a:off x="3479800" y="2311400"/>
+            <a:ext cx="1409700" cy="838200"/>
+          </a:xfrm>
+          <a:prstGeom prst="roundRect">
+            <a:avLst/>
+          </a:prstGeom>
+        </p:spPr>
+        <p:style>
+          <a:lnRef idx="2">
+            <a:schemeClr val="accent5"/>
+          </a:lnRef>
+          <a:fillRef idx="1">
+            <a:schemeClr val="lt1"/>
+          </a:fillRef>
+          <a:effectRef idx="0">
+            <a:schemeClr val="accent5"/>
+          </a:effectRef>
+          <a:fontRef idx="minor">
+            <a:schemeClr val="dk1"/>
+          </a:fontRef>
+        </p:style>
+        <p:txBody>
+          <a:bodyPr rtlCol="0" anchor="ctr"/>
+          <a:lstStyle/>
+          <a:p>
+            <a:pPr algn="ctr"/>
+            <a:r>
+              <a:rPr lang="en-US" dirty="0" smtClean="0"/>
+              <a:t>Routes</a:t>
+            </a:r>
+            <a:endParaRPr lang="en-US" dirty="0"/>
+          </a:p>
+        </p:txBody>
+      </p:sp>
+      <p:sp>
+        <p:nvSpPr>
+          <p:cNvPr id="5" name="Rounded Rectangle 4"/>
+          <p:cNvSpPr/>
+          <p:nvPr/>
+        </p:nvSpPr>
+        <p:spPr>
+          <a:xfrm>
+            <a:off x="5067300" y="2311400"/>
+            <a:ext cx="1409700" cy="838200"/>
+          </a:xfrm>
+          <a:prstGeom prst="roundRect">
+            <a:avLst/>
+          </a:prstGeom>
+        </p:spPr>
+        <p:style>
+          <a:lnRef idx="2">
+            <a:schemeClr val="accent5"/>
+          </a:lnRef>
+          <a:fillRef idx="1">
+            <a:schemeClr val="lt1"/>
+          </a:fillRef>
+          <a:effectRef idx="0">
+            <a:schemeClr val="accent5"/>
+          </a:effectRef>
+          <a:fontRef idx="minor">
+            <a:schemeClr val="dk1"/>
+          </a:fontRef>
+        </p:style>
+        <p:txBody>
+          <a:bodyPr rtlCol="0" anchor="ctr"/>
+          <a:lstStyle/>
+          <a:p>
+            <a:pPr algn="ctr"/>
+            <a:r>
+              <a:rPr lang="en-US" dirty="0" smtClean="0"/>
+              <a:t>Models</a:t>
             </a:r>
             <a:endParaRPr lang="en-US" dirty="0"/>
           </a:p>
@@ -8232,7 +8449,7 @@
               </a:ln>
               <a:extLst>
                 <a:ext uri="{91240B29-F687-4f45-9708-019B960494DF}">
-                  <a14:hiddenLine xmlns:a14="http://schemas.microsoft.com/office/drawing/2010/main" xmlns="" w="9525">
+                  <a14:hiddenLine xmlns="" xmlns:a14="http://schemas.microsoft.com/office/drawing/2010/main" w="9525">
                     <a:solidFill>
                       <a:srgbClr val="000000"/>
                     </a:solidFill>
@@ -8385,7 +8602,7 @@
               </a:ln>
               <a:extLst>
                 <a:ext uri="{91240B29-F687-4f45-9708-019B960494DF}">
-                  <a14:hiddenLine xmlns:a14="http://schemas.microsoft.com/office/drawing/2010/main" xmlns="" w="9525">
+                  <a14:hiddenLine xmlns="" xmlns:a14="http://schemas.microsoft.com/office/drawing/2010/main" w="9525">
                     <a:solidFill>
                       <a:srgbClr val="000000"/>
                     </a:solidFill>
@@ -8537,7 +8754,7 @@
               </a:ln>
               <a:extLst>
                 <a:ext uri="{91240B29-F687-4f45-9708-019B960494DF}">
-                  <a14:hiddenLine xmlns:a14="http://schemas.microsoft.com/office/drawing/2010/main" xmlns="" w="9525">
+                  <a14:hiddenLine xmlns="" xmlns:a14="http://schemas.microsoft.com/office/drawing/2010/main" w="9525">
                     <a:solidFill>
                       <a:srgbClr val="000000"/>
                     </a:solidFill>
@@ -9590,7 +9807,7 @@
             </a:ln>
             <a:extLst>
               <a:ext uri="{91240B29-F687-4f45-9708-019B960494DF}">
-                <a14:hiddenLine xmlns:a14="http://schemas.microsoft.com/office/drawing/2010/main" xmlns="" w="9525">
+                <a14:hiddenLine xmlns="" xmlns:a14="http://schemas.microsoft.com/office/drawing/2010/main" w="9525">
                   <a:solidFill>
                     <a:srgbClr val="000000"/>
                   </a:solidFill>
@@ -10144,7 +10361,7 @@
             </a:ln>
             <a:extLst>
               <a:ext uri="{91240B29-F687-4f45-9708-019B960494DF}">
-                <a14:hiddenLine xmlns:a14="http://schemas.microsoft.com/office/drawing/2010/main" xmlns="" w="9525">
+                <a14:hiddenLine xmlns="" xmlns:a14="http://schemas.microsoft.com/office/drawing/2010/main" w="9525">
                   <a:solidFill>
                     <a:srgbClr val="000000"/>
                   </a:solidFill>
@@ -10693,7 +10910,7 @@
             </a:ln>
             <a:extLst>
               <a:ext uri="{91240B29-F687-4f45-9708-019B960494DF}">
-                <a14:hiddenLine xmlns:a14="http://schemas.microsoft.com/office/drawing/2010/main" xmlns="" w="9525">
+                <a14:hiddenLine xmlns="" xmlns:a14="http://schemas.microsoft.com/office/drawing/2010/main" w="9525">
                   <a:solidFill>
                     <a:srgbClr val="000000"/>
                   </a:solidFill>
@@ -11247,7 +11464,7 @@
             </a:ln>
             <a:extLst>
               <a:ext uri="{91240B29-F687-4f45-9708-019B960494DF}">
-                <a14:hiddenLine xmlns:a14="http://schemas.microsoft.com/office/drawing/2010/main" xmlns="" w="9525">
+                <a14:hiddenLine xmlns="" xmlns:a14="http://schemas.microsoft.com/office/drawing/2010/main" w="9525">
                   <a:solidFill>
                     <a:srgbClr val="000000"/>
                   </a:solidFill>
@@ -11628,7 +11845,7 @@
             </a:ln>
             <a:extLst>
               <a:ext uri="{91240B29-F687-4f45-9708-019B960494DF}">
-                <a14:hiddenLine xmlns:a14="http://schemas.microsoft.com/office/drawing/2010/main" xmlns="" w="9525">
+                <a14:hiddenLine xmlns="" xmlns:a14="http://schemas.microsoft.com/office/drawing/2010/main" w="9525">
                   <a:solidFill>
                     <a:srgbClr val="000000"/>
                   </a:solidFill>
@@ -11901,7 +12118,7 @@
             </a:ln>
             <a:extLst>
               <a:ext uri="{91240B29-F687-4f45-9708-019B960494DF}">
-                <a14:hiddenLine xmlns:a14="http://schemas.microsoft.com/office/drawing/2010/main" xmlns="" w="9525">
+                <a14:hiddenLine xmlns="" xmlns:a14="http://schemas.microsoft.com/office/drawing/2010/main" w="9525">
                   <a:solidFill>
                     <a:srgbClr val="000000"/>
                   </a:solidFill>
@@ -12350,7 +12567,7 @@
             </a:ln>
             <a:extLst>
               <a:ext uri="{91240B29-F687-4f45-9708-019B960494DF}">
-                <a14:hiddenLine xmlns:a14="http://schemas.microsoft.com/office/drawing/2010/main" xmlns="" w="9525">
+                <a14:hiddenLine xmlns="" xmlns:a14="http://schemas.microsoft.com/office/drawing/2010/main" w="9525">
                   <a:solidFill>
                     <a:srgbClr val="000000"/>
                   </a:solidFill>
@@ -12837,7 +13054,7 @@
             </a:ln>
             <a:extLst>
               <a:ext uri="{91240B29-F687-4f45-9708-019B960494DF}">
-                <a14:hiddenLine xmlns:a14="http://schemas.microsoft.com/office/drawing/2010/main" xmlns="" w="9525">
+                <a14:hiddenLine xmlns="" xmlns:a14="http://schemas.microsoft.com/office/drawing/2010/main" w="9525">
                   <a:solidFill>
                     <a:srgbClr val="000000"/>
                   </a:solidFill>
@@ -13324,7 +13541,7 @@
             </a:ln>
             <a:extLst>
               <a:ext uri="{91240B29-F687-4f45-9708-019B960494DF}">
-                <a14:hiddenLine xmlns:a14="http://schemas.microsoft.com/office/drawing/2010/main" xmlns="" w="9525">
+                <a14:hiddenLine xmlns="" xmlns:a14="http://schemas.microsoft.com/office/drawing/2010/main" w="9525">
                   <a:solidFill>
                     <a:srgbClr val="000000"/>
                   </a:solidFill>
@@ -13811,7 +14028,7 @@
             </a:ln>
             <a:extLst>
               <a:ext uri="{91240B29-F687-4f45-9708-019B960494DF}">
-                <a14:hiddenLine xmlns:a14="http://schemas.microsoft.com/office/drawing/2010/main" xmlns="" w="9525">
+                <a14:hiddenLine xmlns="" xmlns:a14="http://schemas.microsoft.com/office/drawing/2010/main" w="9525">
                   <a:solidFill>
                     <a:srgbClr val="000000"/>
                   </a:solidFill>
@@ -14298,7 +14515,7 @@
             </a:ln>
             <a:extLst>
               <a:ext uri="{91240B29-F687-4f45-9708-019B960494DF}">
-                <a14:hiddenLine xmlns:a14="http://schemas.microsoft.com/office/drawing/2010/main" xmlns="" w="9525">
+                <a14:hiddenLine xmlns="" xmlns:a14="http://schemas.microsoft.com/office/drawing/2010/main" w="9525">
                   <a:solidFill>
                     <a:srgbClr val="000000"/>
                   </a:solidFill>
@@ -14675,7 +14892,7 @@
             </a:ln>
             <a:extLst>
               <a:ext uri="{91240B29-F687-4f45-9708-019B960494DF}">
-                <a14:hiddenLine xmlns:a14="http://schemas.microsoft.com/office/drawing/2010/main" xmlns="" w="9525">
+                <a14:hiddenLine xmlns="" xmlns:a14="http://schemas.microsoft.com/office/drawing/2010/main" w="9525">
                   <a:solidFill>
                     <a:srgbClr val="000000"/>
                   </a:solidFill>
@@ -14948,7 +15165,7 @@
             </a:ln>
             <a:extLst>
               <a:ext uri="{91240B29-F687-4f45-9708-019B960494DF}">
-                <a14:hiddenLine xmlns:a14="http://schemas.microsoft.com/office/drawing/2010/main" xmlns="" w="9525">
+                <a14:hiddenLine xmlns="" xmlns:a14="http://schemas.microsoft.com/office/drawing/2010/main" w="9525">
                   <a:solidFill>
                     <a:srgbClr val="000000"/>
                   </a:solidFill>
@@ -16553,8 +16770,31 @@
                   <a:sysClr val="windowText" lastClr="000000"/>
                 </a:solidFill>
               </a:rPr>
-              <a:t> (string) (FK)</a:t>
-            </a:r>
+              <a:t> (string) (FK</a:t>
+            </a:r>
+            <a:r>
+              <a:rPr lang="en-US" sz="1000" dirty="0" smtClean="0">
+                <a:solidFill>
+                  <a:sysClr val="windowText" lastClr="000000"/>
+                </a:solidFill>
+              </a:rPr>
+              <a:t>)</a:t>
+            </a:r>
+          </a:p>
+          <a:p>
+            <a:r>
+              <a:rPr lang="en-US" sz="1000" dirty="0" smtClean="0">
+                <a:solidFill>
+                  <a:sysClr val="windowText" lastClr="000000"/>
+                </a:solidFill>
+              </a:rPr>
+              <a:t>internal (Boolean)</a:t>
+            </a:r>
+            <a:endParaRPr lang="en-US" sz="1000" dirty="0" smtClean="0">
+              <a:solidFill>
+                <a:sysClr val="windowText" lastClr="000000"/>
+              </a:solidFill>
+            </a:endParaRPr>
           </a:p>
         </p:txBody>
       </p:sp>

</xml_diff>